<commit_message>
add minted token `1:TID2` in `refund` box of the buyer;
</commit_message>
<xml_diff>
--- a/docs/design-contracts/dex-contracts.pptx
+++ b/docs/design-contracts/dex-contracts.pptx
@@ -5902,8 +5902,8 @@
         </p:nvSpPr>
         <p:spPr>
           <a:xfrm>
-            <a:off x="300290" y="1548385"/>
-            <a:ext cx="1248114" cy="269256"/>
+            <a:off x="259381" y="1486224"/>
+            <a:ext cx="1248114" cy="371671"/>
           </a:xfrm>
           <a:prstGeom prst="roundRect">
             <a:avLst/>
@@ -5947,6 +5947,19 @@
                 </a:solidFill>
               </a:rPr>
               <a:t>ergAmt: ERG</a:t>
+            </a:r>
+          </a:p>
+          <a:p>
+            <a:r>
+              <a:rPr lang="en-US" sz="1200" noProof="1">
+                <a:solidFill>
+                  <a:schemeClr val="tx1">
+                    <a:lumMod val="75000"/>
+                    <a:lumOff val="25000"/>
+                  </a:schemeClr>
+                </a:solidFill>
+              </a:rPr>
+              <a:t>1:TID2</a:t>
             </a:r>
           </a:p>
         </p:txBody>
@@ -5968,9 +5981,9 @@
           <p:nvPr/>
         </p:nvCxnSpPr>
         <p:spPr>
-          <a:xfrm rot="10800000" flipV="1">
-            <a:off x="1548405" y="1681389"/>
-            <a:ext cx="441909" cy="1624"/>
+          <a:xfrm rot="10800000">
+            <a:off x="1507495" y="1672061"/>
+            <a:ext cx="482818" cy="9329"/>
           </a:xfrm>
           <a:prstGeom prst="bentConnector3">
             <a:avLst>
@@ -6190,7 +6203,7 @@
         </p:nvSpPr>
         <p:spPr>
           <a:xfrm>
-            <a:off x="251994" y="1339536"/>
+            <a:off x="300289" y="1200457"/>
             <a:ext cx="854864" cy="261610"/>
           </a:xfrm>
           <a:prstGeom prst="rect">

</xml_diff>